<commit_message>
add case presentation 2 data
</commit_message>
<xml_diff>
--- a/Case_Presentation_1/ppt/case1_CT_02.pptx
+++ b/Case_Presentation_1/ppt/case1_CT_02.pptx
@@ -6812,7 +6812,7 @@
                 <a16:creationId xmlns:a16="http://schemas.microsoft.com/office/drawing/2014/main" id="{683F1FFD-1AA8-4EC2-97B9-FEC7564F489B}"/>
               </a:ext>
               <a:ext uri="{C183D7F6-B498-43B3-948B-1728B52AA6E4}">
-                <adec:decorative xmlns:adec="http://schemas.microsoft.com/office/drawing/2017/decorative" xmlns="" val="1"/>
+                <adec:decorative xmlns="" xmlns:adec="http://schemas.microsoft.com/office/drawing/2017/decorative" val="1"/>
               </a:ext>
             </a:extLst>
           </p:cNvPr>
@@ -6910,7 +6910,7 @@
                 <a16:creationId xmlns:a16="http://schemas.microsoft.com/office/drawing/2014/main" id="{8FF0F8A7-C9E3-49D9-A67E-09FF582C7821}"/>
               </a:ext>
               <a:ext uri="{C183D7F6-B498-43B3-948B-1728B52AA6E4}">
-                <adec:decorative xmlns:adec="http://schemas.microsoft.com/office/drawing/2017/decorative" xmlns="" val="1"/>
+                <adec:decorative xmlns="" xmlns:adec="http://schemas.microsoft.com/office/drawing/2017/decorative" val="1"/>
               </a:ext>
             </a:extLst>
           </p:cNvPr>
@@ -7079,8 +7079,15 @@
                 <a:latin typeface="Microsoft JhengHei UI" panose="020B0604030504040204" pitchFamily="34" charset="-120"/>
                 <a:ea typeface="Microsoft JhengHei UI" panose="020B0604030504040204" pitchFamily="34" charset="-120"/>
               </a:rPr>
-              <a:t>Group3</a:t>
-            </a:r>
+              <a:t>Group2</a:t>
+            </a:r>
+            <a:endParaRPr lang="en-US" altLang="zh-TW" dirty="0" smtClean="0">
+              <a:solidFill>
+                <a:srgbClr val="EBEBEB"/>
+              </a:solidFill>
+              <a:latin typeface="Microsoft JhengHei UI" panose="020B0604030504040204" pitchFamily="34" charset="-120"/>
+              <a:ea typeface="Microsoft JhengHei UI" panose="020B0604030504040204" pitchFamily="34" charset="-120"/>
+            </a:endParaRPr>
           </a:p>
           <a:p>
             <a:pPr rtl="0"/>
@@ -7166,7 +7173,7 @@
                 <a16:creationId xmlns:a16="http://schemas.microsoft.com/office/drawing/2014/main" id="{A4274C20-A98B-4AC3-B16A-B7F41CB582DC}"/>
               </a:ext>
               <a:ext uri="{C183D7F6-B498-43B3-948B-1728B52AA6E4}">
-                <adec:decorative xmlns:adec="http://schemas.microsoft.com/office/drawing/2017/decorative" xmlns="" val="1"/>
+                <adec:decorative xmlns="" xmlns:adec="http://schemas.microsoft.com/office/drawing/2017/decorative" val="1"/>
               </a:ext>
             </a:extLst>
           </p:cNvPr>
@@ -7197,7 +7204,7 @@
                   <a16:creationId xmlns:a16="http://schemas.microsoft.com/office/drawing/2014/main" id="{43ECC69B-2243-424A-8237-CF490F8B06C1}"/>
                 </a:ext>
                 <a:ext uri="{C183D7F6-B498-43B3-948B-1728B52AA6E4}">
-                  <adec:decorative xmlns:adec="http://schemas.microsoft.com/office/drawing/2017/decorative" xmlns="" val="1"/>
+                  <adec:decorative xmlns="" xmlns:adec="http://schemas.microsoft.com/office/drawing/2017/decorative" val="1"/>
                 </a:ext>
               </a:extLst>
             </p:cNvPr>
@@ -7249,7 +7256,7 @@
                   <a16:creationId xmlns:a16="http://schemas.microsoft.com/office/drawing/2014/main" id="{6D2EA3B9-3D17-4510-8464-E74F67267C00}"/>
                 </a:ext>
                 <a:ext uri="{C183D7F6-B498-43B3-948B-1728B52AA6E4}">
-                  <adec:decorative xmlns:adec="http://schemas.microsoft.com/office/drawing/2017/decorative" xmlns="" val="1"/>
+                  <adec:decorative xmlns="" xmlns:adec="http://schemas.microsoft.com/office/drawing/2017/decorative" val="1"/>
                 </a:ext>
               </a:extLst>
             </p:cNvPr>
@@ -7301,7 +7308,7 @@
                   <a16:creationId xmlns:a16="http://schemas.microsoft.com/office/drawing/2014/main" id="{AA5DFA43-F31D-4C31-8826-6B40A21CF9AD}"/>
                 </a:ext>
                 <a:ext uri="{C183D7F6-B498-43B3-948B-1728B52AA6E4}">
-                  <adec:decorative xmlns:adec="http://schemas.microsoft.com/office/drawing/2017/decorative" xmlns="" val="1"/>
+                  <adec:decorative xmlns="" xmlns:adec="http://schemas.microsoft.com/office/drawing/2017/decorative" val="1"/>
                 </a:ext>
               </a:extLst>
             </p:cNvPr>
@@ -9189,7 +9196,24 @@
                 <a:latin typeface="Microsoft JhengHei UI" panose="020B0604030504040204" pitchFamily="34" charset="-120"/>
                 <a:ea typeface="Microsoft JhengHei UI" panose="020B0604030504040204" pitchFamily="34" charset="-120"/>
               </a:rPr>
-              <a:t>Calculate the average vector of the article and use it as the article </a:t>
+              <a:t>Calculate the </a:t>
+            </a:r>
+            <a:r>
+              <a:rPr lang="en-US" altLang="zh-TW" sz="1600" dirty="0">
+                <a:solidFill>
+                  <a:srgbClr val="FFC000"/>
+                </a:solidFill>
+                <a:latin typeface="Microsoft JhengHei UI" panose="020B0604030504040204" pitchFamily="34" charset="-120"/>
+                <a:ea typeface="Microsoft JhengHei UI" panose="020B0604030504040204" pitchFamily="34" charset="-120"/>
+              </a:rPr>
+              <a:t>average</a:t>
+            </a:r>
+            <a:r>
+              <a:rPr lang="en-US" altLang="zh-TW" sz="1600" dirty="0">
+                <a:latin typeface="Microsoft JhengHei UI" panose="020B0604030504040204" pitchFamily="34" charset="-120"/>
+                <a:ea typeface="Microsoft JhengHei UI" panose="020B0604030504040204" pitchFamily="34" charset="-120"/>
+              </a:rPr>
+              <a:t> vector of the article and use it as the article </a:t>
             </a:r>
             <a:r>
               <a:rPr lang="en-US" altLang="zh-TW" sz="1600" dirty="0" smtClean="0">
@@ -9231,7 +9255,24 @@
                 <a:latin typeface="Microsoft JhengHei UI" panose="020B0604030504040204" pitchFamily="34" charset="-120"/>
                 <a:ea typeface="Microsoft JhengHei UI" panose="020B0604030504040204" pitchFamily="34" charset="-120"/>
               </a:rPr>
-              <a:t>Calculate the weight vector of the article, give the weight to the key words, and use it as the article </a:t>
+              <a:t>Calculate the </a:t>
+            </a:r>
+            <a:r>
+              <a:rPr lang="en-US" altLang="zh-TW" sz="1600" dirty="0">
+                <a:solidFill>
+                  <a:srgbClr val="FFC000"/>
+                </a:solidFill>
+                <a:latin typeface="Microsoft JhengHei UI" panose="020B0604030504040204" pitchFamily="34" charset="-120"/>
+                <a:ea typeface="Microsoft JhengHei UI" panose="020B0604030504040204" pitchFamily="34" charset="-120"/>
+              </a:rPr>
+              <a:t>weight vector </a:t>
+            </a:r>
+            <a:r>
+              <a:rPr lang="en-US" altLang="zh-TW" sz="1600" dirty="0">
+                <a:latin typeface="Microsoft JhengHei UI" panose="020B0604030504040204" pitchFamily="34" charset="-120"/>
+                <a:ea typeface="Microsoft JhengHei UI" panose="020B0604030504040204" pitchFamily="34" charset="-120"/>
+              </a:rPr>
+              <a:t>of the article, give the weight to the key words, and use it as the article </a:t>
             </a:r>
             <a:r>
               <a:rPr lang="en-US" altLang="zh-TW" sz="1600" dirty="0" smtClean="0">
@@ -10799,11 +10840,7 @@
             </a:r>
             <a:r>
               <a:rPr lang="en-US" altLang="zh-TW" dirty="0" err="1" smtClean="0"/>
-              <a:t>Spacy</a:t>
-            </a:r>
-            <a:r>
-              <a:rPr lang="en-US" altLang="zh-TW" dirty="0" err="1" smtClean="0"/>
-              <a:t>.TextCategorizer</a:t>
+              <a:t>Spacy.TextCategorizer</a:t>
             </a:r>
             <a:endParaRPr lang="zh-TW" altLang="en-US" dirty="0"/>
           </a:p>
@@ -20320,7 +20357,7 @@
               <a:buChar char="•"/>
             </a:pPr>
             <a:r>
-              <a:rPr lang="en-US" altLang="zh-TW" sz="1600" dirty="0">
+              <a:rPr lang="en-US" altLang="zh-TW" sz="1600" dirty="0" smtClean="0">
                 <a:latin typeface="Microsoft JhengHei UI" panose="020B0604030504040204" pitchFamily="34" charset="-120"/>
                 <a:ea typeface="Microsoft JhengHei UI" panose="020B0604030504040204" pitchFamily="34" charset="-120"/>
               </a:rPr>
@@ -20333,11 +20370,21 @@
               <a:buAutoNum type="arabicPeriod"/>
             </a:pPr>
             <a:r>
-              <a:rPr lang="en-US" altLang="zh-TW" sz="1600" dirty="0">
-                <a:latin typeface="Microsoft JhengHei UI" panose="020B0604030504040204" pitchFamily="34" charset="-120"/>
-                <a:ea typeface="Microsoft JhengHei UI" panose="020B0604030504040204" pitchFamily="34" charset="-120"/>
-              </a:rPr>
-              <a:t>Testing data based on intuitive judgement</a:t>
+              <a:rPr lang="en-US" altLang="zh-TW" sz="1600" dirty="0" smtClean="0">
+                <a:solidFill>
+                  <a:srgbClr val="FFC000"/>
+                </a:solidFill>
+                <a:latin typeface="Microsoft JhengHei UI" panose="020B0604030504040204" pitchFamily="34" charset="-120"/>
+                <a:ea typeface="Microsoft JhengHei UI" panose="020B0604030504040204" pitchFamily="34" charset="-120"/>
+              </a:rPr>
+              <a:t>Testing data </a:t>
+            </a:r>
+            <a:r>
+              <a:rPr lang="en-US" altLang="zh-TW" sz="1600" dirty="0" smtClean="0">
+                <a:latin typeface="Microsoft JhengHei UI" panose="020B0604030504040204" pitchFamily="34" charset="-120"/>
+                <a:ea typeface="Microsoft JhengHei UI" panose="020B0604030504040204" pitchFamily="34" charset="-120"/>
+              </a:rPr>
+              <a:t>based on intuitive judgement</a:t>
             </a:r>
           </a:p>
           <a:p>
@@ -20346,11 +20393,18 @@
               <a:buChar char="•"/>
             </a:pPr>
             <a:r>
+              <a:rPr lang="en-US" altLang="zh-TW" sz="1600" dirty="0" smtClean="0">
+                <a:latin typeface="Microsoft JhengHei UI" panose="020B0604030504040204" pitchFamily="34" charset="-120"/>
+                <a:ea typeface="Microsoft JhengHei UI" panose="020B0604030504040204" pitchFamily="34" charset="-120"/>
+              </a:rPr>
+              <a:t>Intuitive </a:t>
+            </a:r>
+            <a:r>
               <a:rPr lang="en-US" altLang="zh-TW" sz="1600" dirty="0">
                 <a:latin typeface="Microsoft JhengHei UI" panose="020B0604030504040204" pitchFamily="34" charset="-120"/>
                 <a:ea typeface="Microsoft JhengHei UI" panose="020B0604030504040204" pitchFamily="34" charset="-120"/>
               </a:rPr>
-              <a:t>Intuitive judgement: 200 cases obesity vs. 200 cases absence</a:t>
+              <a:t>judgement: 200 cases obesity vs. 200 cases absence</a:t>
             </a:r>
           </a:p>
         </p:txBody>
@@ -21181,19 +21235,19 @@
         <p:nvCxnSpPr>
           <p:cNvPr id="76" name="肘形接點 75"/>
           <p:cNvCxnSpPr>
-            <a:stCxn id="8" idx="2"/>
+            <a:stCxn id="9" idx="2"/>
             <a:endCxn id="71" idx="2"/>
           </p:cNvCxnSpPr>
           <p:nvPr/>
         </p:nvCxnSpPr>
         <p:spPr>
           <a:xfrm rot="16200000" flipH="1">
-            <a:off x="6189056" y="1655024"/>
-            <a:ext cx="589003" cy="5501611"/>
+            <a:off x="6781177" y="2247145"/>
+            <a:ext cx="641613" cy="4264759"/>
           </a:xfrm>
           <a:prstGeom prst="bentConnector3">
             <a:avLst>
-              <a:gd name="adj1" fmla="val 223490"/>
+              <a:gd name="adj1" fmla="val 218897"/>
             </a:avLst>
           </a:prstGeom>
           <a:ln>
@@ -21624,19 +21678,19 @@
         <p:nvCxnSpPr>
           <p:cNvPr id="124" name="肘形接點 123"/>
           <p:cNvCxnSpPr>
-            <a:stCxn id="8" idx="0"/>
+            <a:stCxn id="9" idx="0"/>
             <a:endCxn id="32" idx="0"/>
           </p:cNvCxnSpPr>
           <p:nvPr/>
         </p:nvCxnSpPr>
         <p:spPr>
           <a:xfrm rot="5400000" flipH="1" flipV="1">
-            <a:off x="6246582" y="446547"/>
-            <a:ext cx="443089" cy="5470748"/>
+            <a:off x="6832483" y="1097498"/>
+            <a:ext cx="508139" cy="4233896"/>
           </a:xfrm>
           <a:prstGeom prst="bentConnector3">
             <a:avLst>
-              <a:gd name="adj1" fmla="val 202246"/>
+              <a:gd name="adj1" fmla="val 237996"/>
             </a:avLst>
           </a:prstGeom>
           <a:ln>
@@ -21743,11 +21797,7 @@
             <a:pPr algn="ctr"/>
             <a:r>
               <a:rPr lang="en-US" altLang="zh-TW" sz="1400" dirty="0" err="1" smtClean="0"/>
-              <a:t>Spacy</a:t>
-            </a:r>
-            <a:r>
-              <a:rPr lang="en-US" altLang="zh-TW" sz="1400" dirty="0" err="1" smtClean="0"/>
-              <a:t>.TextCategorizer</a:t>
+              <a:t>Spacy.TextCategorizer</a:t>
             </a:r>
             <a:endParaRPr lang="en-US" altLang="zh-TW" sz="1400" dirty="0" smtClean="0"/>
           </a:p>
@@ -22222,6 +22272,48 @@
           </a:fontRef>
         </p:style>
       </p:cxnSp>
+      <p:sp>
+        <p:nvSpPr>
+          <p:cNvPr id="16" name="矩形 15"/>
+          <p:cNvSpPr/>
+          <p:nvPr/>
+        </p:nvSpPr>
+        <p:spPr>
+          <a:xfrm>
+            <a:off x="4742995" y="2979242"/>
+            <a:ext cx="570990" cy="369332"/>
+          </a:xfrm>
+          <a:prstGeom prst="rect">
+            <a:avLst/>
+          </a:prstGeom>
+        </p:spPr>
+        <p:txBody>
+          <a:bodyPr wrap="none">
+            <a:spAutoFit/>
+          </a:bodyPr>
+          <a:lstStyle/>
+          <a:p>
+            <a:pPr algn="ctr"/>
+            <a:r>
+              <a:rPr lang="en-US" altLang="zh-TW" dirty="0" smtClean="0">
+                <a:solidFill>
+                  <a:schemeClr val="bg1">
+                    <a:lumMod val="65000"/>
+                  </a:schemeClr>
+                </a:solidFill>
+              </a:rPr>
+              <a:t>10%</a:t>
+            </a:r>
+            <a:endParaRPr lang="en-US" altLang="zh-TW" dirty="0">
+              <a:solidFill>
+                <a:schemeClr val="bg1">
+                  <a:lumMod val="65000"/>
+                </a:schemeClr>
+              </a:solidFill>
+            </a:endParaRPr>
+          </a:p>
+        </p:txBody>
+      </p:sp>
     </p:spTree>
     <p:extLst>
       <p:ext uri="{BB962C8B-B14F-4D97-AF65-F5344CB8AC3E}">
@@ -26109,6 +26201,15 @@
 </file>
 
 <file path=customXml/item1.xml><?xml version="1.0" encoding="utf-8"?>
+<?mso-contentType ?>
+<FormTemplates xmlns="http://schemas.microsoft.com/sharepoint/v3/contenttype/forms">
+  <Display>DocumentLibraryForm</Display>
+  <Edit>DocumentLibraryForm</Edit>
+  <New>DocumentLibraryForm</New>
+</FormTemplates>
+</file>
+
+<file path=customXml/item2.xml><?xml version="1.0" encoding="utf-8"?>
 <ct:contentTypeSchema xmlns:ct="http://schemas.microsoft.com/office/2006/metadata/contentType" xmlns:ma="http://schemas.microsoft.com/office/2006/metadata/properties/metaAttributes" ct:_="" ma:_="" ma:contentTypeName="Document" ma:contentTypeID="0x01010079F111ED35F8CC479449609E8A0923A6" ma:contentTypeVersion="11" ma:contentTypeDescription="Create a new document." ma:contentTypeScope="" ma:versionID="9677210f24a1be23c92c90fd886aa0aa">
   <xsd:schema xmlns:xsd="http://www.w3.org/2001/XMLSchema" xmlns:xs="http://www.w3.org/2001/XMLSchema" xmlns:p="http://schemas.microsoft.com/office/2006/metadata/properties" xmlns:ns2="71af3243-3dd4-4a8d-8c0d-dd76da1f02a5" xmlns:ns3="16c05727-aa75-4e4a-9b5f-8a80a1165891" targetNamespace="http://schemas.microsoft.com/office/2006/metadata/properties" ma:root="true" ma:fieldsID="60e05723c5c1908df1a1a4ebf11d344e" ns2:_="" ns3:_="">
     <xsd:import namespace="71af3243-3dd4-4a8d-8c0d-dd76da1f02a5"/>
@@ -26319,15 +26420,6 @@
 </ct:contentTypeSchema>
 </file>
 
-<file path=customXml/item2.xml><?xml version="1.0" encoding="utf-8"?>
-<?mso-contentType ?>
-<FormTemplates xmlns="http://schemas.microsoft.com/sharepoint/v3/contenttype/forms">
-  <Display>DocumentLibraryForm</Display>
-  <Edit>DocumentLibraryForm</Edit>
-  <New>DocumentLibraryForm</New>
-</FormTemplates>
-</file>
-
 <file path=customXml/item3.xml><?xml version="1.0" encoding="utf-8"?>
 <p:properties xmlns:p="http://schemas.microsoft.com/office/2006/metadata/properties" xmlns:xsi="http://www.w3.org/2001/XMLSchema-instance" xmlns:pc="http://schemas.microsoft.com/office/infopath/2007/PartnerControls">
   <documentManagement>
@@ -26337,6 +26429,14 @@
 </file>
 
 <file path=customXml/itemProps1.xml><?xml version="1.0" encoding="utf-8"?>
+<ds:datastoreItem xmlns:ds="http://schemas.openxmlformats.org/officeDocument/2006/customXml" ds:itemID="{D1CAB62D-49E5-4271-85C6-1466970BAB69}">
+  <ds:schemaRefs>
+    <ds:schemaRef ds:uri="http://schemas.microsoft.com/sharepoint/v3/contenttype/forms"/>
+  </ds:schemaRefs>
+</ds:datastoreItem>
+</file>
+
+<file path=customXml/itemProps2.xml><?xml version="1.0" encoding="utf-8"?>
 <ds:datastoreItem xmlns:ds="http://schemas.openxmlformats.org/officeDocument/2006/customXml" ds:itemID="{D5A32ED2-6DBA-4E14-851E-DE5772C902F3}">
   <ds:schemaRefs>
     <ds:schemaRef ds:uri="http://schemas.microsoft.com/office/2006/metadata/contentType"/>
@@ -26351,14 +26451,6 @@
     <ds:schemaRef ds:uri="http://purl.org/dc/elements/1.1/"/>
     <ds:schemaRef ds:uri="http://purl.org/dc/terms/"/>
     <ds:schemaRef ds:uri="http://schemas.microsoft.com/internal/obd"/>
-  </ds:schemaRefs>
-</ds:datastoreItem>
-</file>
-
-<file path=customXml/itemProps2.xml><?xml version="1.0" encoding="utf-8"?>
-<ds:datastoreItem xmlns:ds="http://schemas.openxmlformats.org/officeDocument/2006/customXml" ds:itemID="{D1CAB62D-49E5-4271-85C6-1466970BAB69}">
-  <ds:schemaRefs>
-    <ds:schemaRef ds:uri="http://schemas.microsoft.com/sharepoint/v3/contenttype/forms"/>
   </ds:schemaRefs>
 </ds:datastoreItem>
 </file>

</xml_diff>